<commit_message>
Nye maler for infoskjerm
</commit_message>
<xml_diff>
--- a/PP_INFOSKJERM_169_LYS.pptx
+++ b/PP_INFOSKJERM_169_LYS.pptx
@@ -2,22 +2,24 @@
 <file path=ppt/presentation.xml><?xml version="1.0" encoding="utf-8"?>
 <p:presentation xmlns:a="http://schemas.openxmlformats.org/drawingml/2006/main" xmlns:r="http://schemas.openxmlformats.org/officeDocument/2006/relationships" xmlns:p="http://schemas.openxmlformats.org/presentationml/2006/main" saveSubsetFonts="1">
   <p:sldMasterIdLst>
-    <p:sldMasterId id="2147483648" r:id="rId1"/>
-    <p:sldMasterId id="2147483697" r:id="rId2"/>
-    <p:sldMasterId id="2147483705" r:id="rId3"/>
-    <p:sldMasterId id="2147483709" r:id="rId4"/>
-    <p:sldMasterId id="2147483713" r:id="rId5"/>
+    <p:sldMasterId id="2147483648" r:id="rId4"/>
+    <p:sldMasterId id="2147483697" r:id="rId5"/>
+    <p:sldMasterId id="2147483705" r:id="rId6"/>
+    <p:sldMasterId id="2147483709" r:id="rId7"/>
+    <p:sldMasterId id="2147483713" r:id="rId8"/>
   </p:sldMasterIdLst>
   <p:notesMasterIdLst>
-    <p:notesMasterId r:id="rId12"/>
+    <p:notesMasterId r:id="rId17"/>
   </p:notesMasterIdLst>
   <p:sldIdLst>
-    <p:sldId id="256" r:id="rId6"/>
-    <p:sldId id="257" r:id="rId7"/>
-    <p:sldId id="258" r:id="rId8"/>
-    <p:sldId id="259" r:id="rId9"/>
-    <p:sldId id="260" r:id="rId10"/>
-    <p:sldId id="261" r:id="rId11"/>
+    <p:sldId id="256" r:id="rId9"/>
+    <p:sldId id="262" r:id="rId10"/>
+    <p:sldId id="263" r:id="rId11"/>
+    <p:sldId id="257" r:id="rId12"/>
+    <p:sldId id="258" r:id="rId13"/>
+    <p:sldId id="259" r:id="rId14"/>
+    <p:sldId id="260" r:id="rId15"/>
+    <p:sldId id="261" r:id="rId16"/>
   </p:sldIdLst>
   <p:sldSz cx="9144000" cy="5145088"/>
   <p:notesSz cx="6858000" cy="9144000"/>
@@ -135,6 +137,14 @@
 </p:presentation>
 </file>
 
+<file path=ppt/revisionInfo.xml><?xml version="1.0" encoding="utf-8"?>
+<p1510:revInfo xmlns:a="http://schemas.openxmlformats.org/drawingml/2006/main" xmlns:r="http://schemas.openxmlformats.org/officeDocument/2006/relationships" xmlns:p1510="http://schemas.microsoft.com/office/powerpoint/2015/10/main">
+  <p1510:revLst>
+    <p1510:client id="{E0B6320A-044A-436B-8FA5-03119685378A}" v="2" dt="2021-09-28T08:13:12.825"/>
+  </p1510:revLst>
+</p1510:revInfo>
+</file>
+
 <file path=ppt/notesMasters/notesMaster1.xml><?xml version="1.0" encoding="utf-8"?>
 <p:notesMaster xmlns:a="http://schemas.openxmlformats.org/drawingml/2006/main" xmlns:r="http://schemas.openxmlformats.org/officeDocument/2006/relationships" xmlns:p="http://schemas.openxmlformats.org/presentationml/2006/main">
   <p:cSld>
@@ -217,7 +227,7 @@
           <a:p>
             <a:fld id="{FE3CBABE-916E-4AAD-B057-5389DC7DF64C}" type="datetimeFigureOut">
               <a:rPr lang="nb-NO" smtClean="0"/>
-              <a:t>02.07.2021</a:t>
+              <a:t>05.01.2022</a:t>
             </a:fld>
             <a:endParaRPr lang="nb-NO"/>
           </a:p>
@@ -554,6 +564,105 @@
 </file>
 
 <file path=ppt/slideLayouts/slideLayout10.xml><?xml version="1.0" encoding="utf-8"?>
+<p:sldLayout xmlns:a="http://schemas.openxmlformats.org/drawingml/2006/main" xmlns:r="http://schemas.openxmlformats.org/officeDocument/2006/relationships" xmlns:p="http://schemas.openxmlformats.org/presentationml/2006/main" type="titleOnly" preserve="1">
+  <p:cSld name="Bare tittel">
+    <p:spTree>
+      <p:nvGrpSpPr>
+        <p:cNvPr id="1" name=""/>
+        <p:cNvGrpSpPr/>
+        <p:nvPr/>
+      </p:nvGrpSpPr>
+      <p:grpSpPr>
+        <a:xfrm>
+          <a:off x="0" y="0"/>
+          <a:ext cx="0" cy="0"/>
+          <a:chOff x="0" y="0"/>
+          <a:chExt cx="0" cy="0"/>
+        </a:xfrm>
+      </p:grpSpPr>
+      <p:sp>
+        <p:nvSpPr>
+          <p:cNvPr id="2" name="Tittel 1">
+            <a:extLst>
+              <a:ext uri="{FF2B5EF4-FFF2-40B4-BE49-F238E27FC236}">
+                <a16:creationId xmlns:a16="http://schemas.microsoft.com/office/drawing/2014/main" id="{E0764C0C-83B7-4D1E-983A-72FBDF20A411}"/>
+              </a:ext>
+            </a:extLst>
+          </p:cNvPr>
+          <p:cNvSpPr>
+            <a:spLocks noGrp="1"/>
+          </p:cNvSpPr>
+          <p:nvPr>
+            <p:ph type="title"/>
+          </p:nvPr>
+        </p:nvSpPr>
+        <p:spPr>
+          <a:xfrm>
+            <a:off x="794250" y="2074638"/>
+            <a:ext cx="7694550" cy="993775"/>
+          </a:xfrm>
+        </p:spPr>
+        <p:txBody>
+          <a:bodyPr>
+            <a:normAutofit/>
+          </a:bodyPr>
+          <a:lstStyle>
+            <a:lvl1pPr algn="ctr">
+              <a:defRPr sz="2800"/>
+            </a:lvl1pPr>
+          </a:lstStyle>
+          <a:p>
+            <a:r>
+              <a:rPr lang="nb-NO" dirty="0"/>
+              <a:t>Klikk for å redigere tittelstil</a:t>
+            </a:r>
+          </a:p>
+        </p:txBody>
+      </p:sp>
+    </p:spTree>
+    <p:extLst>
+      <p:ext uri="{BB962C8B-B14F-4D97-AF65-F5344CB8AC3E}">
+        <p14:creationId xmlns:p14="http://schemas.microsoft.com/office/powerpoint/2010/main" val="1400847308"/>
+      </p:ext>
+    </p:extLst>
+  </p:cSld>
+  <p:clrMapOvr>
+    <a:masterClrMapping/>
+  </p:clrMapOvr>
+</p:sldLayout>
+</file>
+
+<file path=ppt/slideLayouts/slideLayout11.xml><?xml version="1.0" encoding="utf-8"?>
+<p:sldLayout xmlns:a="http://schemas.openxmlformats.org/drawingml/2006/main" xmlns:r="http://schemas.openxmlformats.org/officeDocument/2006/relationships" xmlns:p="http://schemas.openxmlformats.org/presentationml/2006/main" type="blank" preserve="1">
+  <p:cSld name="Tomt">
+    <p:spTree>
+      <p:nvGrpSpPr>
+        <p:cNvPr id="1" name=""/>
+        <p:cNvGrpSpPr/>
+        <p:nvPr/>
+      </p:nvGrpSpPr>
+      <p:grpSpPr>
+        <a:xfrm>
+          <a:off x="0" y="0"/>
+          <a:ext cx="0" cy="0"/>
+          <a:chOff x="0" y="0"/>
+          <a:chExt cx="0" cy="0"/>
+        </a:xfrm>
+      </p:grpSpPr>
+    </p:spTree>
+    <p:extLst>
+      <p:ext uri="{BB962C8B-B14F-4D97-AF65-F5344CB8AC3E}">
+        <p14:creationId xmlns:p14="http://schemas.microsoft.com/office/powerpoint/2010/main" val="3975087911"/>
+      </p:ext>
+    </p:extLst>
+  </p:cSld>
+  <p:clrMapOvr>
+    <a:masterClrMapping/>
+  </p:clrMapOvr>
+</p:sldLayout>
+</file>
+
+<file path=ppt/slideLayouts/slideLayout12.xml><?xml version="1.0" encoding="utf-8"?>
 <p:sldLayout xmlns:a="http://schemas.openxmlformats.org/drawingml/2006/main" xmlns:r="http://schemas.openxmlformats.org/officeDocument/2006/relationships" xmlns:p="http://schemas.openxmlformats.org/presentationml/2006/main" type="title" preserve="1">
   <p:cSld name="Tittellysbilde">
     <p:bg>
@@ -707,7 +816,7 @@
 </p:sldLayout>
 </file>
 
-<file path=ppt/slideLayouts/slideLayout11.xml><?xml version="1.0" encoding="utf-8"?>
+<file path=ppt/slideLayouts/slideLayout13.xml><?xml version="1.0" encoding="utf-8"?>
 <p:sldLayout xmlns:a="http://schemas.openxmlformats.org/drawingml/2006/main" xmlns:r="http://schemas.openxmlformats.org/officeDocument/2006/relationships" xmlns:p="http://schemas.openxmlformats.org/presentationml/2006/main" type="titleOnly" preserve="1">
   <p:cSld name="Bare tittel">
     <p:bg>
@@ -784,7 +893,7 @@
 </p:sldLayout>
 </file>
 
-<file path=ppt/slideLayouts/slideLayout12.xml><?xml version="1.0" encoding="utf-8"?>
+<file path=ppt/slideLayouts/slideLayout14.xml><?xml version="1.0" encoding="utf-8"?>
 <p:sldLayout xmlns:a="http://schemas.openxmlformats.org/drawingml/2006/main" xmlns:r="http://schemas.openxmlformats.org/officeDocument/2006/relationships" xmlns:p="http://schemas.openxmlformats.org/presentationml/2006/main" type="blank" preserve="1">
   <p:cSld name="Tomt">
     <p:bg>
@@ -822,7 +931,7 @@
 </p:sldLayout>
 </file>
 
-<file path=ppt/slideLayouts/slideLayout13.xml><?xml version="1.0" encoding="utf-8"?>
+<file path=ppt/slideLayouts/slideLayout15.xml><?xml version="1.0" encoding="utf-8"?>
 <p:sldLayout xmlns:a="http://schemas.openxmlformats.org/drawingml/2006/main" xmlns:r="http://schemas.openxmlformats.org/officeDocument/2006/relationships" xmlns:p="http://schemas.openxmlformats.org/presentationml/2006/main" type="title" preserve="1">
   <p:cSld name="Tittellysbilde">
     <p:bg>
@@ -976,7 +1085,7 @@
 </p:sldLayout>
 </file>
 
-<file path=ppt/slideLayouts/slideLayout14.xml><?xml version="1.0" encoding="utf-8"?>
+<file path=ppt/slideLayouts/slideLayout16.xml><?xml version="1.0" encoding="utf-8"?>
 <p:sldLayout xmlns:a="http://schemas.openxmlformats.org/drawingml/2006/main" xmlns:r="http://schemas.openxmlformats.org/officeDocument/2006/relationships" xmlns:p="http://schemas.openxmlformats.org/presentationml/2006/main" type="titleOnly" preserve="1">
   <p:cSld name="Bare tittel">
     <p:bg>
@@ -1053,7 +1162,7 @@
 </p:sldLayout>
 </file>
 
-<file path=ppt/slideLayouts/slideLayout15.xml><?xml version="1.0" encoding="utf-8"?>
+<file path=ppt/slideLayouts/slideLayout17.xml><?xml version="1.0" encoding="utf-8"?>
 <p:sldLayout xmlns:a="http://schemas.openxmlformats.org/drawingml/2006/main" xmlns:r="http://schemas.openxmlformats.org/officeDocument/2006/relationships" xmlns:p="http://schemas.openxmlformats.org/presentationml/2006/main" type="blank" preserve="1">
   <p:cSld name="Tomt">
     <p:bg>
@@ -1091,13 +1200,13 @@
 </p:sldLayout>
 </file>
 
-<file path=ppt/slideLayouts/slideLayout16.xml><?xml version="1.0" encoding="utf-8"?>
+<file path=ppt/slideLayouts/slideLayout18.xml><?xml version="1.0" encoding="utf-8"?>
 <p:sldLayout xmlns:a="http://schemas.openxmlformats.org/drawingml/2006/main" xmlns:r="http://schemas.openxmlformats.org/officeDocument/2006/relationships" xmlns:p="http://schemas.openxmlformats.org/presentationml/2006/main" type="title" preserve="1">
   <p:cSld name="Tittellysbilde">
     <p:bg>
       <p:bgPr>
         <a:solidFill>
-          <a:srgbClr val="428527"/>
+          <a:schemeClr val="accent6"/>
         </a:solidFill>
         <a:effectLst/>
       </p:bgPr>
@@ -1245,13 +1354,13 @@
 </p:sldLayout>
 </file>
 
-<file path=ppt/slideLayouts/slideLayout17.xml><?xml version="1.0" encoding="utf-8"?>
+<file path=ppt/slideLayouts/slideLayout19.xml><?xml version="1.0" encoding="utf-8"?>
 <p:sldLayout xmlns:a="http://schemas.openxmlformats.org/drawingml/2006/main" xmlns:r="http://schemas.openxmlformats.org/officeDocument/2006/relationships" xmlns:p="http://schemas.openxmlformats.org/presentationml/2006/main" type="titleOnly" preserve="1">
   <p:cSld name="Bare tittel">
     <p:bg>
       <p:bgPr>
         <a:solidFill>
-          <a:srgbClr val="428527"/>
+          <a:schemeClr val="accent6"/>
         </a:solidFill>
         <a:effectLst/>
       </p:bgPr>
@@ -1322,13 +1431,169 @@
 </p:sldLayout>
 </file>
 
-<file path=ppt/slideLayouts/slideLayout18.xml><?xml version="1.0" encoding="utf-8"?>
+<file path=ppt/slideLayouts/slideLayout2.xml><?xml version="1.0" encoding="utf-8"?>
+<p:sldLayout xmlns:a="http://schemas.openxmlformats.org/drawingml/2006/main" xmlns:r="http://schemas.openxmlformats.org/officeDocument/2006/relationships" xmlns:p="http://schemas.openxmlformats.org/presentationml/2006/main" preserve="1" userDrawn="1">
+  <p:cSld name="Bilde, tittel og rød strek">
+    <p:spTree>
+      <p:nvGrpSpPr>
+        <p:cNvPr id="1" name=""/>
+        <p:cNvGrpSpPr/>
+        <p:nvPr/>
+      </p:nvGrpSpPr>
+      <p:grpSpPr>
+        <a:xfrm>
+          <a:off x="0" y="0"/>
+          <a:ext cx="0" cy="0"/>
+          <a:chOff x="0" y="0"/>
+          <a:chExt cx="0" cy="0"/>
+        </a:xfrm>
+      </p:grpSpPr>
+      <p:sp>
+        <p:nvSpPr>
+          <p:cNvPr id="10" name="Picture Placeholder 9">
+            <a:extLst>
+              <a:ext uri="{FF2B5EF4-FFF2-40B4-BE49-F238E27FC236}">
+                <a16:creationId xmlns:a16="http://schemas.microsoft.com/office/drawing/2014/main" id="{EBB785D6-56F2-421B-9C6E-0CE161F6B873}"/>
+              </a:ext>
+            </a:extLst>
+          </p:cNvPr>
+          <p:cNvSpPr>
+            <a:spLocks noGrp="1"/>
+          </p:cNvSpPr>
+          <p:nvPr>
+            <p:ph type="pic" sz="quarter" idx="10"/>
+          </p:nvPr>
+        </p:nvSpPr>
+        <p:spPr>
+          <a:xfrm>
+            <a:off x="0" y="0"/>
+            <a:ext cx="9144000" cy="5145088"/>
+          </a:xfrm>
+          <a:solidFill>
+            <a:srgbClr val="F6F6F6"/>
+          </a:solidFill>
+        </p:spPr>
+        <p:txBody>
+          <a:bodyPr>
+            <a:normAutofit/>
+          </a:bodyPr>
+          <a:lstStyle>
+            <a:lvl1pPr marL="0" indent="0">
+              <a:buNone/>
+              <a:defRPr sz="1200"/>
+            </a:lvl1pPr>
+          </a:lstStyle>
+          <a:p>
+            <a:endParaRPr lang="en-GB" dirty="0"/>
+          </a:p>
+        </p:txBody>
+      </p:sp>
+      <p:sp>
+        <p:nvSpPr>
+          <p:cNvPr id="17" name="Text Placeholder 16">
+            <a:extLst>
+              <a:ext uri="{FF2B5EF4-FFF2-40B4-BE49-F238E27FC236}">
+                <a16:creationId xmlns:a16="http://schemas.microsoft.com/office/drawing/2014/main" id="{E7A3D93F-B7C3-4F5A-B7D9-2F41E5150842}"/>
+              </a:ext>
+            </a:extLst>
+          </p:cNvPr>
+          <p:cNvSpPr>
+            <a:spLocks noGrp="1"/>
+          </p:cNvSpPr>
+          <p:nvPr>
+            <p:ph type="body" sz="quarter" idx="12"/>
+          </p:nvPr>
+        </p:nvSpPr>
+        <p:spPr>
+          <a:xfrm>
+            <a:off x="-1" y="4419599"/>
+            <a:ext cx="6234113" cy="409576"/>
+          </a:xfrm>
+          <a:blipFill>
+            <a:blip r:embed="rId2">
+              <a:extLst>
+                <a:ext uri="{96DAC541-7B7A-43D3-8B79-37D633B846F1}">
+                  <asvg:svgBlip xmlns:asvg="http://schemas.microsoft.com/office/drawing/2016/SVG/main" r:embed="rId3"/>
+                </a:ext>
+              </a:extLst>
+            </a:blip>
+            <a:stretch>
+              <a:fillRect/>
+            </a:stretch>
+          </a:blipFill>
+        </p:spPr>
+        <p:txBody>
+          <a:bodyPr anchor="ctr"/>
+          <a:lstStyle>
+            <a:lvl1pPr marL="0" indent="0" algn="ctr">
+              <a:buNone/>
+              <a:defRPr>
+                <a:solidFill>
+                  <a:schemeClr val="bg1"/>
+                </a:solidFill>
+              </a:defRPr>
+            </a:lvl1pPr>
+          </a:lstStyle>
+          <a:p>
+            <a:pPr lvl="0"/>
+            <a:endParaRPr lang="en-GB" dirty="0"/>
+          </a:p>
+        </p:txBody>
+      </p:sp>
+      <p:sp>
+        <p:nvSpPr>
+          <p:cNvPr id="5" name="Title 1">
+            <a:extLst>
+              <a:ext uri="{FF2B5EF4-FFF2-40B4-BE49-F238E27FC236}">
+                <a16:creationId xmlns:a16="http://schemas.microsoft.com/office/drawing/2014/main" id="{DBA346C4-9141-4DE3-B9EB-D70AEDA055A3}"/>
+              </a:ext>
+            </a:extLst>
+          </p:cNvPr>
+          <p:cNvSpPr>
+            <a:spLocks noGrp="1"/>
+          </p:cNvSpPr>
+          <p:nvPr>
+            <p:ph type="title"/>
+          </p:nvPr>
+        </p:nvSpPr>
+        <p:spPr>
+          <a:xfrm>
+            <a:off x="628650" y="351954"/>
+            <a:ext cx="7886700" cy="828104"/>
+          </a:xfrm>
+        </p:spPr>
+        <p:txBody>
+          <a:bodyPr/>
+          <a:lstStyle/>
+          <a:p>
+            <a:r>
+              <a:rPr lang="en-US" dirty="0"/>
+              <a:t>Click to edit Master title style</a:t>
+            </a:r>
+            <a:endParaRPr lang="en-GB" dirty="0"/>
+          </a:p>
+        </p:txBody>
+      </p:sp>
+    </p:spTree>
+    <p:extLst>
+      <p:ext uri="{BB962C8B-B14F-4D97-AF65-F5344CB8AC3E}">
+        <p14:creationId xmlns:p14="http://schemas.microsoft.com/office/powerpoint/2010/main" val="1845730131"/>
+      </p:ext>
+    </p:extLst>
+  </p:cSld>
+  <p:clrMapOvr>
+    <a:masterClrMapping/>
+  </p:clrMapOvr>
+</p:sldLayout>
+</file>
+
+<file path=ppt/slideLayouts/slideLayout20.xml><?xml version="1.0" encoding="utf-8"?>
 <p:sldLayout xmlns:a="http://schemas.openxmlformats.org/drawingml/2006/main" xmlns:r="http://schemas.openxmlformats.org/officeDocument/2006/relationships" xmlns:p="http://schemas.openxmlformats.org/presentationml/2006/main" type="blank" preserve="1">
   <p:cSld name="Tomt">
     <p:bg>
       <p:bgPr>
         <a:solidFill>
-          <a:srgbClr val="428527"/>
+          <a:schemeClr val="accent6"/>
         </a:solidFill>
         <a:effectLst/>
       </p:bgPr>
@@ -1360,7 +1625,167 @@
 </p:sldLayout>
 </file>
 
-<file path=ppt/slideLayouts/slideLayout2.xml><?xml version="1.0" encoding="utf-8"?>
+<file path=ppt/slideLayouts/slideLayout3.xml><?xml version="1.0" encoding="utf-8"?>
+<p:sldLayout xmlns:a="http://schemas.openxmlformats.org/drawingml/2006/main" xmlns:r="http://schemas.openxmlformats.org/officeDocument/2006/relationships" xmlns:p="http://schemas.openxmlformats.org/presentationml/2006/main" preserve="1" userDrawn="1">
+  <p:cSld name="Bilde og tekst">
+    <p:spTree>
+      <p:nvGrpSpPr>
+        <p:cNvPr id="1" name=""/>
+        <p:cNvGrpSpPr/>
+        <p:nvPr/>
+      </p:nvGrpSpPr>
+      <p:grpSpPr>
+        <a:xfrm>
+          <a:off x="0" y="0"/>
+          <a:ext cx="0" cy="0"/>
+          <a:chOff x="0" y="0"/>
+          <a:chExt cx="0" cy="0"/>
+        </a:xfrm>
+      </p:grpSpPr>
+      <p:sp>
+        <p:nvSpPr>
+          <p:cNvPr id="8" name="Picture Placeholder 9">
+            <a:extLst>
+              <a:ext uri="{FF2B5EF4-FFF2-40B4-BE49-F238E27FC236}">
+                <a16:creationId xmlns:a16="http://schemas.microsoft.com/office/drawing/2014/main" id="{CBBDFCF7-F532-477F-8A1A-E900E1DC9286}"/>
+              </a:ext>
+            </a:extLst>
+          </p:cNvPr>
+          <p:cNvSpPr>
+            <a:spLocks noGrp="1"/>
+          </p:cNvSpPr>
+          <p:nvPr>
+            <p:ph type="pic" sz="quarter" idx="10" hasCustomPrompt="1"/>
+          </p:nvPr>
+        </p:nvSpPr>
+        <p:spPr>
+          <a:xfrm>
+            <a:off x="0" y="0"/>
+            <a:ext cx="9144000" cy="5145088"/>
+          </a:xfrm>
+          <a:solidFill>
+            <a:srgbClr val="F6F6F6"/>
+          </a:solidFill>
+        </p:spPr>
+        <p:txBody>
+          <a:bodyPr anchor="b">
+            <a:normAutofit/>
+          </a:bodyPr>
+          <a:lstStyle>
+            <a:lvl1pPr marL="0" indent="0" algn="r">
+              <a:buNone/>
+              <a:defRPr sz="1200"/>
+            </a:lvl1pPr>
+          </a:lstStyle>
+          <a:p>
+            <a:r>
+              <a:rPr lang="nb-NO" dirty="0"/>
+              <a:t>Klikk Sett inn – Bilder – for å endre eller sette inn bilde</a:t>
+            </a:r>
+            <a:endParaRPr lang="en-GB" dirty="0"/>
+          </a:p>
+        </p:txBody>
+      </p:sp>
+      <p:pic>
+        <p:nvPicPr>
+          <p:cNvPr id="7" name="Picture 6" descr="A picture containing text, water, outdoor, shore&#10;&#10;Description automatically generated" hidden="1">
+            <a:extLst>
+              <a:ext uri="{FF2B5EF4-FFF2-40B4-BE49-F238E27FC236}">
+                <a16:creationId xmlns:a16="http://schemas.microsoft.com/office/drawing/2014/main" id="{5926DC9E-0DDA-48BD-AF72-57784B22A7CF}"/>
+              </a:ext>
+            </a:extLst>
+          </p:cNvPr>
+          <p:cNvPicPr>
+            <a:picLocks noChangeAspect="1"/>
+          </p:cNvPicPr>
+          <p:nvPr userDrawn="1"/>
+        </p:nvPicPr>
+        <p:blipFill>
+          <a:blip r:embed="rId2">
+            <a:extLst>
+              <a:ext uri="{28A0092B-C50C-407E-A947-70E740481C1C}">
+                <a14:useLocalDpi xmlns:a14="http://schemas.microsoft.com/office/drawing/2010/main" val="0"/>
+              </a:ext>
+            </a:extLst>
+          </a:blip>
+          <a:stretch>
+            <a:fillRect/>
+          </a:stretch>
+        </p:blipFill>
+        <p:spPr>
+          <a:xfrm>
+            <a:off x="4905" y="0"/>
+            <a:ext cx="9134189" cy="5145088"/>
+          </a:xfrm>
+          <a:prstGeom prst="rect">
+            <a:avLst/>
+          </a:prstGeom>
+        </p:spPr>
+      </p:pic>
+      <p:sp>
+        <p:nvSpPr>
+          <p:cNvPr id="12" name="Text Placeholder 11">
+            <a:extLst>
+              <a:ext uri="{FF2B5EF4-FFF2-40B4-BE49-F238E27FC236}">
+                <a16:creationId xmlns:a16="http://schemas.microsoft.com/office/drawing/2014/main" id="{2FA06A6E-EF01-4423-B229-C83BB34ADB95}"/>
+              </a:ext>
+            </a:extLst>
+          </p:cNvPr>
+          <p:cNvSpPr>
+            <a:spLocks noGrp="1"/>
+          </p:cNvSpPr>
+          <p:nvPr>
+            <p:ph type="body" sz="quarter" idx="11"/>
+          </p:nvPr>
+        </p:nvSpPr>
+        <p:spPr>
+          <a:xfrm>
+            <a:off x="1448475" y="0"/>
+            <a:ext cx="3192685" cy="5145088"/>
+          </a:xfrm>
+          <a:blipFill>
+            <a:blip r:embed="rId3">
+              <a:extLst>
+                <a:ext uri="{96DAC541-7B7A-43D3-8B79-37D633B846F1}">
+                  <asvg:svgBlip xmlns:asvg="http://schemas.microsoft.com/office/drawing/2016/SVG/main" r:embed="rId4"/>
+                </a:ext>
+              </a:extLst>
+            </a:blip>
+            <a:stretch>
+              <a:fillRect/>
+            </a:stretch>
+          </a:blipFill>
+        </p:spPr>
+        <p:txBody>
+          <a:bodyPr lIns="612000" rIns="468000" anchor="ctr">
+            <a:normAutofit/>
+          </a:bodyPr>
+          <a:lstStyle>
+            <a:lvl1pPr marL="0" indent="0" algn="l">
+              <a:buNone/>
+              <a:defRPr sz="2400"/>
+            </a:lvl1pPr>
+          </a:lstStyle>
+          <a:p>
+            <a:pPr lvl="0"/>
+            <a:endParaRPr lang="nb-NO" noProof="0" dirty="0"/>
+          </a:p>
+        </p:txBody>
+      </p:sp>
+    </p:spTree>
+    <p:extLst>
+      <p:ext uri="{BB962C8B-B14F-4D97-AF65-F5344CB8AC3E}">
+        <p14:creationId xmlns:p14="http://schemas.microsoft.com/office/powerpoint/2010/main" val="425695827"/>
+      </p:ext>
+    </p:extLst>
+  </p:cSld>
+  <p:clrMapOvr>
+    <a:masterClrMapping/>
+  </p:clrMapOvr>
+</p:sldLayout>
+</file>
+
+<file path=ppt/slideLayouts/slideLayout4.xml><?xml version="1.0" encoding="utf-8"?>
 <p:sldLayout xmlns:a="http://schemas.openxmlformats.org/drawingml/2006/main" xmlns:r="http://schemas.openxmlformats.org/officeDocument/2006/relationships" xmlns:p="http://schemas.openxmlformats.org/presentationml/2006/main" preserve="1" userDrawn="1">
   <p:cSld name="Tittellysbilde">
     <p:spTree>
@@ -1659,7 +2084,7 @@
 </p:sldLayout>
 </file>
 
-<file path=ppt/slideLayouts/slideLayout3.xml><?xml version="1.0" encoding="utf-8"?>
+<file path=ppt/slideLayouts/slideLayout5.xml><?xml version="1.0" encoding="utf-8"?>
 <p:sldLayout xmlns:a="http://schemas.openxmlformats.org/drawingml/2006/main" xmlns:r="http://schemas.openxmlformats.org/officeDocument/2006/relationships" xmlns:p="http://schemas.openxmlformats.org/presentationml/2006/main" type="obj" preserve="1">
   <p:cSld name="Tittel og innhold">
     <p:spTree>
@@ -1933,7 +2358,7 @@
 </p:sldLayout>
 </file>
 
-<file path=ppt/slideLayouts/slideLayout4.xml><?xml version="1.0" encoding="utf-8"?>
+<file path=ppt/slideLayouts/slideLayout6.xml><?xml version="1.0" encoding="utf-8"?>
 <p:sldLayout xmlns:a="http://schemas.openxmlformats.org/drawingml/2006/main" xmlns:r="http://schemas.openxmlformats.org/officeDocument/2006/relationships" xmlns:p="http://schemas.openxmlformats.org/presentationml/2006/main" preserve="1" userDrawn="1">
   <p:cSld name="To innholdsdeler">
     <p:spTree>
@@ -2269,7 +2694,7 @@
 </p:sldLayout>
 </file>
 
-<file path=ppt/slideLayouts/slideLayout5.xml><?xml version="1.0" encoding="utf-8"?>
+<file path=ppt/slideLayouts/slideLayout7.xml><?xml version="1.0" encoding="utf-8"?>
 <p:sldLayout xmlns:a="http://schemas.openxmlformats.org/drawingml/2006/main" xmlns:r="http://schemas.openxmlformats.org/officeDocument/2006/relationships" xmlns:p="http://schemas.openxmlformats.org/presentationml/2006/main" type="titleOnly" preserve="1">
   <p:cSld name="Bare tittel">
     <p:spTree>
@@ -2491,7 +2916,7 @@
 </p:sldLayout>
 </file>
 
-<file path=ppt/slideLayouts/slideLayout6.xml><?xml version="1.0" encoding="utf-8"?>
+<file path=ppt/slideLayouts/slideLayout8.xml><?xml version="1.0" encoding="utf-8"?>
 <p:sldLayout xmlns:a="http://schemas.openxmlformats.org/drawingml/2006/main" xmlns:r="http://schemas.openxmlformats.org/officeDocument/2006/relationships" xmlns:p="http://schemas.openxmlformats.org/presentationml/2006/main" type="blank" preserve="1">
   <p:cSld name="Tomt">
     <p:spTree>
@@ -2691,7 +3116,7 @@
 </p:sldLayout>
 </file>
 
-<file path=ppt/slideLayouts/slideLayout7.xml><?xml version="1.0" encoding="utf-8"?>
+<file path=ppt/slideLayouts/slideLayout9.xml><?xml version="1.0" encoding="utf-8"?>
 <p:sldLayout xmlns:a="http://schemas.openxmlformats.org/drawingml/2006/main" xmlns:r="http://schemas.openxmlformats.org/officeDocument/2006/relationships" xmlns:p="http://schemas.openxmlformats.org/presentationml/2006/main" type="title" preserve="1">
   <p:cSld name="Tittellysbilde">
     <p:spTree>
@@ -2837,105 +3262,6 @@
 </p:sldLayout>
 </file>
 
-<file path=ppt/slideLayouts/slideLayout8.xml><?xml version="1.0" encoding="utf-8"?>
-<p:sldLayout xmlns:a="http://schemas.openxmlformats.org/drawingml/2006/main" xmlns:r="http://schemas.openxmlformats.org/officeDocument/2006/relationships" xmlns:p="http://schemas.openxmlformats.org/presentationml/2006/main" type="titleOnly" preserve="1">
-  <p:cSld name="Bare tittel">
-    <p:spTree>
-      <p:nvGrpSpPr>
-        <p:cNvPr id="1" name=""/>
-        <p:cNvGrpSpPr/>
-        <p:nvPr/>
-      </p:nvGrpSpPr>
-      <p:grpSpPr>
-        <a:xfrm>
-          <a:off x="0" y="0"/>
-          <a:ext cx="0" cy="0"/>
-          <a:chOff x="0" y="0"/>
-          <a:chExt cx="0" cy="0"/>
-        </a:xfrm>
-      </p:grpSpPr>
-      <p:sp>
-        <p:nvSpPr>
-          <p:cNvPr id="2" name="Tittel 1">
-            <a:extLst>
-              <a:ext uri="{FF2B5EF4-FFF2-40B4-BE49-F238E27FC236}">
-                <a16:creationId xmlns:a16="http://schemas.microsoft.com/office/drawing/2014/main" id="{E0764C0C-83B7-4D1E-983A-72FBDF20A411}"/>
-              </a:ext>
-            </a:extLst>
-          </p:cNvPr>
-          <p:cNvSpPr>
-            <a:spLocks noGrp="1"/>
-          </p:cNvSpPr>
-          <p:nvPr>
-            <p:ph type="title"/>
-          </p:nvPr>
-        </p:nvSpPr>
-        <p:spPr>
-          <a:xfrm>
-            <a:off x="794250" y="2074638"/>
-            <a:ext cx="7694550" cy="993775"/>
-          </a:xfrm>
-        </p:spPr>
-        <p:txBody>
-          <a:bodyPr>
-            <a:normAutofit/>
-          </a:bodyPr>
-          <a:lstStyle>
-            <a:lvl1pPr algn="ctr">
-              <a:defRPr sz="2800"/>
-            </a:lvl1pPr>
-          </a:lstStyle>
-          <a:p>
-            <a:r>
-              <a:rPr lang="nb-NO" dirty="0"/>
-              <a:t>Klikk for å redigere tittelstil</a:t>
-            </a:r>
-          </a:p>
-        </p:txBody>
-      </p:sp>
-    </p:spTree>
-    <p:extLst>
-      <p:ext uri="{BB962C8B-B14F-4D97-AF65-F5344CB8AC3E}">
-        <p14:creationId xmlns:p14="http://schemas.microsoft.com/office/powerpoint/2010/main" val="1400847308"/>
-      </p:ext>
-    </p:extLst>
-  </p:cSld>
-  <p:clrMapOvr>
-    <a:masterClrMapping/>
-  </p:clrMapOvr>
-</p:sldLayout>
-</file>
-
-<file path=ppt/slideLayouts/slideLayout9.xml><?xml version="1.0" encoding="utf-8"?>
-<p:sldLayout xmlns:a="http://schemas.openxmlformats.org/drawingml/2006/main" xmlns:r="http://schemas.openxmlformats.org/officeDocument/2006/relationships" xmlns:p="http://schemas.openxmlformats.org/presentationml/2006/main" type="blank" preserve="1">
-  <p:cSld name="Tomt">
-    <p:spTree>
-      <p:nvGrpSpPr>
-        <p:cNvPr id="1" name=""/>
-        <p:cNvGrpSpPr/>
-        <p:nvPr/>
-      </p:nvGrpSpPr>
-      <p:grpSpPr>
-        <a:xfrm>
-          <a:off x="0" y="0"/>
-          <a:ext cx="0" cy="0"/>
-          <a:chOff x="0" y="0"/>
-          <a:chExt cx="0" cy="0"/>
-        </a:xfrm>
-      </p:grpSpPr>
-    </p:spTree>
-    <p:extLst>
-      <p:ext uri="{BB962C8B-B14F-4D97-AF65-F5344CB8AC3E}">
-        <p14:creationId xmlns:p14="http://schemas.microsoft.com/office/powerpoint/2010/main" val="3975087911"/>
-      </p:ext>
-    </p:extLst>
-  </p:cSld>
-  <p:clrMapOvr>
-    <a:masterClrMapping/>
-  </p:clrMapOvr>
-</p:sldLayout>
-</file>
-
 <file path=ppt/slideMasters/slideMaster1.xml><?xml version="1.0" encoding="utf-8"?>
 <p:sldMaster xmlns:a="http://schemas.openxmlformats.org/drawingml/2006/main" xmlns:r="http://schemas.openxmlformats.org/officeDocument/2006/relationships" xmlns:p="http://schemas.openxmlformats.org/presentationml/2006/main">
   <p:cSld>
@@ -3116,7 +3442,7 @@
           <p:nvPr userDrawn="1"/>
         </p:nvPicPr>
         <p:blipFill>
-          <a:blip r:embed="rId8" cstate="print">
+          <a:blip r:embed="rId10" cstate="print">
             <a:extLst>
               <a:ext uri="{28A0092B-C50C-407E-A947-70E740481C1C}">
                 <a14:useLocalDpi xmlns:a14="http://schemas.microsoft.com/office/drawing/2010/main" val="0"/>
@@ -3147,11 +3473,13 @@
   <p:clrMap bg1="lt1" tx1="dk1" bg2="lt2" tx2="dk2" accent1="accent1" accent2="accent2" accent3="accent3" accent4="accent4" accent5="accent5" accent6="accent6" hlink="hlink" folHlink="folHlink"/>
   <p:sldLayoutIdLst>
     <p:sldLayoutId id="2147483660" r:id="rId1"/>
-    <p:sldLayoutId id="2147483649" r:id="rId2"/>
-    <p:sldLayoutId id="2147483650" r:id="rId3"/>
-    <p:sldLayoutId id="2147483652" r:id="rId4"/>
-    <p:sldLayoutId id="2147483654" r:id="rId5"/>
-    <p:sldLayoutId id="2147483655" r:id="rId6"/>
+    <p:sldLayoutId id="2147483717" r:id="rId2"/>
+    <p:sldLayoutId id="2147483718" r:id="rId3"/>
+    <p:sldLayoutId id="2147483649" r:id="rId4"/>
+    <p:sldLayoutId id="2147483650" r:id="rId5"/>
+    <p:sldLayoutId id="2147483652" r:id="rId6"/>
+    <p:sldLayoutId id="2147483654" r:id="rId7"/>
+    <p:sldLayoutId id="2147483655" r:id="rId8"/>
   </p:sldLayoutIdLst>
   <p:hf sldNum="0" hdr="0" dt="0"/>
   <p:txStyles>
@@ -4721,7 +5049,7 @@
     <p:bg>
       <p:bgPr>
         <a:solidFill>
-          <a:srgbClr val="428527"/>
+          <a:schemeClr val="accent6"/>
         </a:solidFill>
         <a:effectLst/>
       </p:bgPr>
@@ -5193,6 +5521,177 @@
       </p:grpSpPr>
       <p:sp>
         <p:nvSpPr>
+          <p:cNvPr id="2" name="Picture Placeholder 1">
+            <a:extLst>
+              <a:ext uri="{FF2B5EF4-FFF2-40B4-BE49-F238E27FC236}">
+                <a16:creationId xmlns:a16="http://schemas.microsoft.com/office/drawing/2014/main" id="{51A11E6E-1F35-41CE-925A-22E3205A3CA7}"/>
+              </a:ext>
+            </a:extLst>
+          </p:cNvPr>
+          <p:cNvSpPr>
+            <a:spLocks noGrp="1"/>
+          </p:cNvSpPr>
+          <p:nvPr>
+            <p:ph type="pic" sz="quarter" idx="10"/>
+          </p:nvPr>
+        </p:nvSpPr>
+        <p:spPr/>
+      </p:sp>
+      <p:sp>
+        <p:nvSpPr>
+          <p:cNvPr id="3" name="Text Placeholder 2">
+            <a:extLst>
+              <a:ext uri="{FF2B5EF4-FFF2-40B4-BE49-F238E27FC236}">
+                <a16:creationId xmlns:a16="http://schemas.microsoft.com/office/drawing/2014/main" id="{2D6EF9A1-659A-4F5D-8167-3DA51FF677D7}"/>
+              </a:ext>
+            </a:extLst>
+          </p:cNvPr>
+          <p:cNvSpPr>
+            <a:spLocks noGrp="1"/>
+          </p:cNvSpPr>
+          <p:nvPr>
+            <p:ph type="body" sz="quarter" idx="12"/>
+          </p:nvPr>
+        </p:nvSpPr>
+        <p:spPr/>
+        <p:txBody>
+          <a:bodyPr/>
+          <a:lstStyle/>
+          <a:p>
+            <a:endParaRPr lang="en-US"/>
+          </a:p>
+        </p:txBody>
+      </p:sp>
+      <p:sp>
+        <p:nvSpPr>
+          <p:cNvPr id="4" name="Title 3">
+            <a:extLst>
+              <a:ext uri="{FF2B5EF4-FFF2-40B4-BE49-F238E27FC236}">
+                <a16:creationId xmlns:a16="http://schemas.microsoft.com/office/drawing/2014/main" id="{F16AB33E-9333-46A8-8539-C1D8453DFB3E}"/>
+              </a:ext>
+            </a:extLst>
+          </p:cNvPr>
+          <p:cNvSpPr>
+            <a:spLocks noGrp="1"/>
+          </p:cNvSpPr>
+          <p:nvPr>
+            <p:ph type="title"/>
+          </p:nvPr>
+        </p:nvSpPr>
+        <p:spPr/>
+        <p:txBody>
+          <a:bodyPr/>
+          <a:lstStyle/>
+          <a:p>
+            <a:endParaRPr lang="en-US"/>
+          </a:p>
+        </p:txBody>
+      </p:sp>
+    </p:spTree>
+    <p:extLst>
+      <p:ext uri="{BB962C8B-B14F-4D97-AF65-F5344CB8AC3E}">
+        <p14:creationId xmlns:p14="http://schemas.microsoft.com/office/powerpoint/2010/main" val="3606371142"/>
+      </p:ext>
+    </p:extLst>
+  </p:cSld>
+  <p:clrMapOvr>
+    <a:masterClrMapping/>
+  </p:clrMapOvr>
+</p:sld>
+</file>
+
+<file path=ppt/slides/slide3.xml><?xml version="1.0" encoding="utf-8"?>
+<p:sld xmlns:a="http://schemas.openxmlformats.org/drawingml/2006/main" xmlns:r="http://schemas.openxmlformats.org/officeDocument/2006/relationships" xmlns:p="http://schemas.openxmlformats.org/presentationml/2006/main">
+  <p:cSld>
+    <p:spTree>
+      <p:nvGrpSpPr>
+        <p:cNvPr id="1" name=""/>
+        <p:cNvGrpSpPr/>
+        <p:nvPr/>
+      </p:nvGrpSpPr>
+      <p:grpSpPr>
+        <a:xfrm>
+          <a:off x="0" y="0"/>
+          <a:ext cx="0" cy="0"/>
+          <a:chOff x="0" y="0"/>
+          <a:chExt cx="0" cy="0"/>
+        </a:xfrm>
+      </p:grpSpPr>
+      <p:sp>
+        <p:nvSpPr>
+          <p:cNvPr id="2" name="Picture Placeholder 1">
+            <a:extLst>
+              <a:ext uri="{FF2B5EF4-FFF2-40B4-BE49-F238E27FC236}">
+                <a16:creationId xmlns:a16="http://schemas.microsoft.com/office/drawing/2014/main" id="{158CFD12-2FC5-4A73-A439-BAE558363E3D}"/>
+              </a:ext>
+            </a:extLst>
+          </p:cNvPr>
+          <p:cNvSpPr>
+            <a:spLocks noGrp="1"/>
+          </p:cNvSpPr>
+          <p:nvPr>
+            <p:ph type="pic" sz="quarter" idx="10"/>
+          </p:nvPr>
+        </p:nvSpPr>
+        <p:spPr/>
+      </p:sp>
+      <p:sp>
+        <p:nvSpPr>
+          <p:cNvPr id="3" name="Text Placeholder 2">
+            <a:extLst>
+              <a:ext uri="{FF2B5EF4-FFF2-40B4-BE49-F238E27FC236}">
+                <a16:creationId xmlns:a16="http://schemas.microsoft.com/office/drawing/2014/main" id="{002B38E0-9687-4AB2-8D5A-3852F5DFB6CC}"/>
+              </a:ext>
+            </a:extLst>
+          </p:cNvPr>
+          <p:cNvSpPr>
+            <a:spLocks noGrp="1"/>
+          </p:cNvSpPr>
+          <p:nvPr>
+            <p:ph type="body" sz="quarter" idx="11"/>
+          </p:nvPr>
+        </p:nvSpPr>
+        <p:spPr/>
+        <p:txBody>
+          <a:bodyPr/>
+          <a:lstStyle/>
+          <a:p>
+            <a:endParaRPr lang="en-US"/>
+          </a:p>
+        </p:txBody>
+      </p:sp>
+    </p:spTree>
+    <p:extLst>
+      <p:ext uri="{BB962C8B-B14F-4D97-AF65-F5344CB8AC3E}">
+        <p14:creationId xmlns:p14="http://schemas.microsoft.com/office/powerpoint/2010/main" val="1786918936"/>
+      </p:ext>
+    </p:extLst>
+  </p:cSld>
+  <p:clrMapOvr>
+    <a:masterClrMapping/>
+  </p:clrMapOvr>
+</p:sld>
+</file>
+
+<file path=ppt/slides/slide4.xml><?xml version="1.0" encoding="utf-8"?>
+<p:sld xmlns:a="http://schemas.openxmlformats.org/drawingml/2006/main" xmlns:r="http://schemas.openxmlformats.org/officeDocument/2006/relationships" xmlns:p="http://schemas.openxmlformats.org/presentationml/2006/main">
+  <p:cSld>
+    <p:spTree>
+      <p:nvGrpSpPr>
+        <p:cNvPr id="1" name=""/>
+        <p:cNvGrpSpPr/>
+        <p:nvPr/>
+      </p:nvGrpSpPr>
+      <p:grpSpPr>
+        <a:xfrm>
+          <a:off x="0" y="0"/>
+          <a:ext cx="0" cy="0"/>
+          <a:chOff x="0" y="0"/>
+          <a:chExt cx="0" cy="0"/>
+        </a:xfrm>
+      </p:grpSpPr>
+      <p:sp>
+        <p:nvSpPr>
           <p:cNvPr id="2" name="Tittel 1"/>
           <p:cNvSpPr>
             <a:spLocks noGrp="1"/>
@@ -5267,7 +5766,7 @@
 </p:sld>
 </file>
 
-<file path=ppt/slides/slide3.xml><?xml version="1.0" encoding="utf-8"?>
+<file path=ppt/slides/slide5.xml><?xml version="1.0" encoding="utf-8"?>
 <p:sld xmlns:a="http://schemas.openxmlformats.org/drawingml/2006/main" xmlns:r="http://schemas.openxmlformats.org/officeDocument/2006/relationships" xmlns:p="http://schemas.openxmlformats.org/presentationml/2006/main">
   <p:cSld>
     <p:spTree>
@@ -5347,7 +5846,7 @@
 </p:sld>
 </file>
 
-<file path=ppt/slides/slide4.xml><?xml version="1.0" encoding="utf-8"?>
+<file path=ppt/slides/slide6.xml><?xml version="1.0" encoding="utf-8"?>
 <p:sld xmlns:a="http://schemas.openxmlformats.org/drawingml/2006/main" xmlns:r="http://schemas.openxmlformats.org/officeDocument/2006/relationships" xmlns:p="http://schemas.openxmlformats.org/presentationml/2006/main">
   <p:cSld>
     <p:spTree>
@@ -5427,7 +5926,7 @@
 </p:sld>
 </file>
 
-<file path=ppt/slides/slide5.xml><?xml version="1.0" encoding="utf-8"?>
+<file path=ppt/slides/slide7.xml><?xml version="1.0" encoding="utf-8"?>
 <p:sld xmlns:a="http://schemas.openxmlformats.org/drawingml/2006/main" xmlns:r="http://schemas.openxmlformats.org/officeDocument/2006/relationships" xmlns:p="http://schemas.openxmlformats.org/presentationml/2006/main">
   <p:cSld>
     <p:spTree>
@@ -5507,7 +6006,7 @@
 </p:sld>
 </file>
 
-<file path=ppt/slides/slide6.xml><?xml version="1.0" encoding="utf-8"?>
+<file path=ppt/slides/slide8.xml><?xml version="1.0" encoding="utf-8"?>
 <p:sld xmlns:a="http://schemas.openxmlformats.org/drawingml/2006/main" xmlns:r="http://schemas.openxmlformats.org/officeDocument/2006/relationships" xmlns:p="http://schemas.openxmlformats.org/presentationml/2006/main">
   <p:cSld>
     <p:spTree>
@@ -5590,7 +6089,7 @@
 <file path=ppt/theme/theme1.xml><?xml version="1.0" encoding="utf-8"?>
 <a:theme xmlns:a="http://schemas.openxmlformats.org/drawingml/2006/main" name="Office-tema">
   <a:themeElements>
-    <a:clrScheme name="Egendefinert 14">
+    <a:clrScheme name="Bergen kommune">
       <a:dk1>
         <a:sysClr val="windowText" lastClr="000000"/>
       </a:dk1>
@@ -5601,31 +6100,31 @@
         <a:srgbClr val="DC1E23"/>
       </a:dk2>
       <a:lt2>
-        <a:srgbClr val="BF9D23"/>
+        <a:srgbClr val="F2F2F2"/>
       </a:lt2>
       <a:accent1>
         <a:srgbClr val="DC1E23"/>
       </a:accent1>
       <a:accent2>
-        <a:srgbClr val="BF9D23"/>
+        <a:srgbClr val="164B81"/>
       </a:accent2>
       <a:accent3>
         <a:srgbClr val="702C80"/>
       </a:accent3>
       <a:accent4>
-        <a:srgbClr val="164B81"/>
+        <a:srgbClr val="BF9D23"/>
       </a:accent4>
       <a:accent5>
-        <a:srgbClr val="428527"/>
+        <a:srgbClr val="F6EDCE"/>
       </a:accent5>
       <a:accent6>
-        <a:srgbClr val="EDDC9E"/>
+        <a:srgbClr val="117845"/>
       </a:accent6>
       <a:hlink>
-        <a:srgbClr val="0563C1"/>
+        <a:srgbClr val="164B81"/>
       </a:hlink>
       <a:folHlink>
-        <a:srgbClr val="954F72"/>
+        <a:srgbClr val="702C80"/>
       </a:folHlink>
     </a:clrScheme>
     <a:fontScheme name="Custom 2">
@@ -5782,7 +6281,7 @@
   <a:extraClrSchemeLst/>
   <a:extLst>
     <a:ext uri="{05A4C25C-085E-4340-85A3-A5531E510DB2}">
-      <thm15:themeFamily xmlns:thm15="http://schemas.microsoft.com/office/thememl/2012/main" name="PPT_infoskjerm_widescreen_lys.potx" id="{DF53BF6D-7CBC-487D-B7FB-01872F878526}" vid="{8F25FA15-BD0A-45E3-9B75-D169599959E3}"/>
+      <thm15:themeFamily xmlns:thm15="http://schemas.microsoft.com/office/thememl/2012/main" name="PP_INFOSKJERM_169_LYS.potx" id="{6A5A436D-2AFF-4FBE-BA0B-F420AE03F615}" vid="{6CE15769-D7B6-407C-9A4F-961DC2ED09A8}"/>
     </a:ext>
   </a:extLst>
 </a:theme>
@@ -5791,7 +6290,7 @@
 <file path=ppt/theme/theme2.xml><?xml version="1.0" encoding="utf-8"?>
 <a:theme xmlns:a="http://schemas.openxmlformats.org/drawingml/2006/main" name="3_Egendefinert utforming">
   <a:themeElements>
-    <a:clrScheme name="Office">
+    <a:clrScheme name="Custom 8">
       <a:dk1>
         <a:sysClr val="windowText" lastClr="000000"/>
       </a:dk1>
@@ -5799,28 +6298,28 @@
         <a:sysClr val="window" lastClr="FFFFFF"/>
       </a:lt1>
       <a:dk2>
-        <a:srgbClr val="44546A"/>
+        <a:srgbClr val="DC1E23"/>
       </a:dk2>
       <a:lt2>
-        <a:srgbClr val="E7E6E6"/>
+        <a:srgbClr val="BF9D23"/>
       </a:lt2>
       <a:accent1>
-        <a:srgbClr val="4472C4"/>
+        <a:srgbClr val="DC1E23"/>
       </a:accent1>
       <a:accent2>
-        <a:srgbClr val="ED7D31"/>
+        <a:srgbClr val="BF9D23"/>
       </a:accent2>
       <a:accent3>
-        <a:srgbClr val="A5A5A5"/>
+        <a:srgbClr val="702C80"/>
       </a:accent3>
       <a:accent4>
-        <a:srgbClr val="FFC000"/>
+        <a:srgbClr val="164B81"/>
       </a:accent4>
       <a:accent5>
-        <a:srgbClr val="5B9BD5"/>
+        <a:srgbClr val="117845"/>
       </a:accent5>
       <a:accent6>
-        <a:srgbClr val="70AD47"/>
+        <a:srgbClr val="EDDC9E"/>
       </a:accent6>
       <a:hlink>
         <a:srgbClr val="0563C1"/>
@@ -6077,7 +6576,7 @@
   <a:extraClrSchemeLst/>
   <a:extLst>
     <a:ext uri="{05A4C25C-085E-4340-85A3-A5531E510DB2}">
-      <thm15:themeFamily xmlns:thm15="http://schemas.microsoft.com/office/thememl/2012/main" name="Office Theme" id="{62F939B6-93AF-4DB8-9C6B-D6C7DFDC589F}" vid="{4A3C46E8-61CC-4603-A589-7422A47A8E4A}"/>
+      <thm15:themeFamily xmlns:thm15="http://schemas.microsoft.com/office/thememl/2012/main" name="PP_INFOSKJERM_169_LYS.potx" id="{6A5A436D-2AFF-4FBE-BA0B-F420AE03F615}" vid="{05D226AF-3EA5-4A30-AD55-0550C96A791D}"/>
     </a:ext>
   </a:extLst>
 </a:theme>
@@ -6086,7 +6585,7 @@
 <file path=ppt/theme/theme3.xml><?xml version="1.0" encoding="utf-8"?>
 <a:theme xmlns:a="http://schemas.openxmlformats.org/drawingml/2006/main" name="4_Egendefinert utforming">
   <a:themeElements>
-    <a:clrScheme name="Office">
+    <a:clrScheme name="Custom 5">
       <a:dk1>
         <a:sysClr val="windowText" lastClr="000000"/>
       </a:dk1>
@@ -6094,28 +6593,28 @@
         <a:sysClr val="window" lastClr="FFFFFF"/>
       </a:lt1>
       <a:dk2>
-        <a:srgbClr val="44546A"/>
+        <a:srgbClr val="DC1E23"/>
       </a:dk2>
       <a:lt2>
-        <a:srgbClr val="E7E6E6"/>
+        <a:srgbClr val="BF9D23"/>
       </a:lt2>
       <a:accent1>
-        <a:srgbClr val="4472C4"/>
+        <a:srgbClr val="DC1E23"/>
       </a:accent1>
       <a:accent2>
-        <a:srgbClr val="ED7D31"/>
+        <a:srgbClr val="BF9D23"/>
       </a:accent2>
       <a:accent3>
-        <a:srgbClr val="A5A5A5"/>
+        <a:srgbClr val="702C80"/>
       </a:accent3>
       <a:accent4>
-        <a:srgbClr val="FFC000"/>
+        <a:srgbClr val="164B81"/>
       </a:accent4>
       <a:accent5>
-        <a:srgbClr val="5B9BD5"/>
+        <a:srgbClr val="117845"/>
       </a:accent5>
       <a:accent6>
-        <a:srgbClr val="70AD47"/>
+        <a:srgbClr val="EDDC9E"/>
       </a:accent6>
       <a:hlink>
         <a:srgbClr val="0563C1"/>
@@ -6372,7 +6871,7 @@
   <a:extraClrSchemeLst/>
   <a:extLst>
     <a:ext uri="{05A4C25C-085E-4340-85A3-A5531E510DB2}">
-      <thm15:themeFamily xmlns:thm15="http://schemas.microsoft.com/office/thememl/2012/main" name="Office Theme" id="{62F939B6-93AF-4DB8-9C6B-D6C7DFDC589F}" vid="{4A3C46E8-61CC-4603-A589-7422A47A8E4A}"/>
+      <thm15:themeFamily xmlns:thm15="http://schemas.microsoft.com/office/thememl/2012/main" name="PP_INFOSKJERM_169_LYS.potx" id="{6A5A436D-2AFF-4FBE-BA0B-F420AE03F615}" vid="{147C5A8D-3FEC-413C-9BE8-B8335731DAC3}"/>
     </a:ext>
   </a:extLst>
 </a:theme>
@@ -6381,7 +6880,7 @@
 <file path=ppt/theme/theme4.xml><?xml version="1.0" encoding="utf-8"?>
 <a:theme xmlns:a="http://schemas.openxmlformats.org/drawingml/2006/main" name="5_Egendefinert utforming">
   <a:themeElements>
-    <a:clrScheme name="Office">
+    <a:clrScheme name="Custom 5">
       <a:dk1>
         <a:sysClr val="windowText" lastClr="000000"/>
       </a:dk1>
@@ -6389,28 +6888,28 @@
         <a:sysClr val="window" lastClr="FFFFFF"/>
       </a:lt1>
       <a:dk2>
-        <a:srgbClr val="44546A"/>
+        <a:srgbClr val="DC1E23"/>
       </a:dk2>
       <a:lt2>
-        <a:srgbClr val="E7E6E6"/>
+        <a:srgbClr val="BF9D23"/>
       </a:lt2>
       <a:accent1>
-        <a:srgbClr val="4472C4"/>
+        <a:srgbClr val="DC1E23"/>
       </a:accent1>
       <a:accent2>
-        <a:srgbClr val="ED7D31"/>
+        <a:srgbClr val="BF9D23"/>
       </a:accent2>
       <a:accent3>
-        <a:srgbClr val="A5A5A5"/>
+        <a:srgbClr val="702C80"/>
       </a:accent3>
       <a:accent4>
-        <a:srgbClr val="FFC000"/>
+        <a:srgbClr val="164B81"/>
       </a:accent4>
       <a:accent5>
-        <a:srgbClr val="5B9BD5"/>
+        <a:srgbClr val="117845"/>
       </a:accent5>
       <a:accent6>
-        <a:srgbClr val="70AD47"/>
+        <a:srgbClr val="EDDC9E"/>
       </a:accent6>
       <a:hlink>
         <a:srgbClr val="0563C1"/>
@@ -6667,7 +7166,7 @@
   <a:extraClrSchemeLst/>
   <a:extLst>
     <a:ext uri="{05A4C25C-085E-4340-85A3-A5531E510DB2}">
-      <thm15:themeFamily xmlns:thm15="http://schemas.microsoft.com/office/thememl/2012/main" name="Office Theme" id="{62F939B6-93AF-4DB8-9C6B-D6C7DFDC589F}" vid="{4A3C46E8-61CC-4603-A589-7422A47A8E4A}"/>
+      <thm15:themeFamily xmlns:thm15="http://schemas.microsoft.com/office/thememl/2012/main" name="PP_INFOSKJERM_169_LYS.potx" id="{6A5A436D-2AFF-4FBE-BA0B-F420AE03F615}" vid="{7ACD7751-817B-4BF7-887B-DF15CA107C80}"/>
     </a:ext>
   </a:extLst>
 </a:theme>
@@ -6676,7 +7175,7 @@
 <file path=ppt/theme/theme5.xml><?xml version="1.0" encoding="utf-8"?>
 <a:theme xmlns:a="http://schemas.openxmlformats.org/drawingml/2006/main" name="6_Egendefinert utforming">
   <a:themeElements>
-    <a:clrScheme name="Office">
+    <a:clrScheme name="Bergen kommune">
       <a:dk1>
         <a:sysClr val="windowText" lastClr="000000"/>
       </a:dk1>
@@ -6684,34 +7183,34 @@
         <a:sysClr val="window" lastClr="FFFFFF"/>
       </a:lt1>
       <a:dk2>
-        <a:srgbClr val="44546A"/>
+        <a:srgbClr val="DC1E23"/>
       </a:dk2>
       <a:lt2>
-        <a:srgbClr val="E7E6E6"/>
+        <a:srgbClr val="F2F2F2"/>
       </a:lt2>
       <a:accent1>
-        <a:srgbClr val="4472C4"/>
+        <a:srgbClr val="DC1E23"/>
       </a:accent1>
       <a:accent2>
-        <a:srgbClr val="ED7D31"/>
+        <a:srgbClr val="164B81"/>
       </a:accent2>
       <a:accent3>
-        <a:srgbClr val="A5A5A5"/>
+        <a:srgbClr val="702C80"/>
       </a:accent3>
       <a:accent4>
-        <a:srgbClr val="FFC000"/>
+        <a:srgbClr val="BF9D23"/>
       </a:accent4>
       <a:accent5>
-        <a:srgbClr val="5B9BD5"/>
+        <a:srgbClr val="F6EDCE"/>
       </a:accent5>
       <a:accent6>
-        <a:srgbClr val="70AD47"/>
+        <a:srgbClr val="117845"/>
       </a:accent6>
       <a:hlink>
-        <a:srgbClr val="0563C1"/>
+        <a:srgbClr val="164B81"/>
       </a:hlink>
       <a:folHlink>
-        <a:srgbClr val="954F72"/>
+        <a:srgbClr val="702C80"/>
       </a:folHlink>
     </a:clrScheme>
     <a:fontScheme name="Office">
@@ -6962,7 +7461,7 @@
   <a:extraClrSchemeLst/>
   <a:extLst>
     <a:ext uri="{05A4C25C-085E-4340-85A3-A5531E510DB2}">
-      <thm15:themeFamily xmlns:thm15="http://schemas.microsoft.com/office/thememl/2012/main" name="Office Theme" id="{62F939B6-93AF-4DB8-9C6B-D6C7DFDC589F}" vid="{4A3C46E8-61CC-4603-A589-7422A47A8E4A}"/>
+      <thm15:themeFamily xmlns:thm15="http://schemas.microsoft.com/office/thememl/2012/main" name="PP_INFOSKJERM_169_LYS.potx" id="{6A5A436D-2AFF-4FBE-BA0B-F420AE03F615}" vid="{AB1D9F0E-1EEE-46AC-BF70-F24D30566696}"/>
     </a:ext>
   </a:extLst>
 </a:theme>
@@ -7227,4 +7726,244 @@
     </a:ext>
   </a:extLst>
 </a:theme>
+</file>
+
+<file path=customXml/item1.xml><?xml version="1.0" encoding="utf-8"?>
+<ct:contentTypeSchema xmlns:ct="http://schemas.microsoft.com/office/2006/metadata/contentType" xmlns:ma="http://schemas.microsoft.com/office/2006/metadata/properties/metaAttributes" ct:_="" ma:_="" ma:contentTypeName="Dokument" ma:contentTypeID="0x010100D982FC97A4EB864EBF6B6ADD443A67CC" ma:contentTypeVersion="11" ma:contentTypeDescription="Opprett et nytt dokument." ma:contentTypeScope="" ma:versionID="1243dad0bdc800c2168160044757ccfa">
+  <xsd:schema xmlns:xsd="http://www.w3.org/2001/XMLSchema" xmlns:xs="http://www.w3.org/2001/XMLSchema" xmlns:p="http://schemas.microsoft.com/office/2006/metadata/properties" xmlns:ns2="3b00a67f-9791-437e-b702-303a706ea042" targetNamespace="http://schemas.microsoft.com/office/2006/metadata/properties" ma:root="true" ma:fieldsID="9f2b7ce840c78a2065a44a5a957cc1d0" ns2:_="">
+    <xsd:import namespace="3b00a67f-9791-437e-b702-303a706ea042"/>
+    <xsd:element name="properties">
+      <xsd:complexType>
+        <xsd:sequence>
+          <xsd:element name="documentManagement">
+            <xsd:complexType>
+              <xsd:all>
+                <xsd:element ref="ns2:MediaServiceMetadata" minOccurs="0"/>
+                <xsd:element ref="ns2:MediaServiceFastMetadata" minOccurs="0"/>
+                <xsd:element ref="ns2:MediaServiceAutoTags" minOccurs="0"/>
+                <xsd:element ref="ns2:MediaServiceGenerationTime" minOccurs="0"/>
+                <xsd:element ref="ns2:MediaServiceEventHashCode" minOccurs="0"/>
+                <xsd:element ref="ns2:MediaServiceDateTaken" minOccurs="0"/>
+                <xsd:element ref="ns2:MediaServiceOCR" minOccurs="0"/>
+                <xsd:element ref="ns2:MediaServiceAutoKeyPoints" minOccurs="0"/>
+                <xsd:element ref="ns2:MediaServiceKeyPoints" minOccurs="0"/>
+                <xsd:element ref="ns2:MediaServiceLocation" minOccurs="0"/>
+                <xsd:element ref="ns2:MediaLengthInSeconds" minOccurs="0"/>
+              </xsd:all>
+            </xsd:complexType>
+          </xsd:element>
+        </xsd:sequence>
+      </xsd:complexType>
+    </xsd:element>
+  </xsd:schema>
+  <xsd:schema xmlns:xsd="http://www.w3.org/2001/XMLSchema" xmlns:xs="http://www.w3.org/2001/XMLSchema" xmlns:dms="http://schemas.microsoft.com/office/2006/documentManagement/types" xmlns:pc="http://schemas.microsoft.com/office/infopath/2007/PartnerControls" targetNamespace="3b00a67f-9791-437e-b702-303a706ea042" elementFormDefault="qualified">
+    <xsd:import namespace="http://schemas.microsoft.com/office/2006/documentManagement/types"/>
+    <xsd:import namespace="http://schemas.microsoft.com/office/infopath/2007/PartnerControls"/>
+    <xsd:element name="MediaServiceMetadata" ma:index="8" nillable="true" ma:displayName="MediaServiceMetadata" ma:hidden="true" ma:internalName="MediaServiceMetadata" ma:readOnly="true">
+      <xsd:simpleType>
+        <xsd:restriction base="dms:Note"/>
+      </xsd:simpleType>
+    </xsd:element>
+    <xsd:element name="MediaServiceFastMetadata" ma:index="9" nillable="true" ma:displayName="MediaServiceFastMetadata" ma:hidden="true" ma:internalName="MediaServiceFastMetadata" ma:readOnly="true">
+      <xsd:simpleType>
+        <xsd:restriction base="dms:Note"/>
+      </xsd:simpleType>
+    </xsd:element>
+    <xsd:element name="MediaServiceAutoTags" ma:index="10" nillable="true" ma:displayName="Tags" ma:internalName="MediaServiceAutoTags" ma:readOnly="true">
+      <xsd:simpleType>
+        <xsd:restriction base="dms:Text"/>
+      </xsd:simpleType>
+    </xsd:element>
+    <xsd:element name="MediaServiceGenerationTime" ma:index="11" nillable="true" ma:displayName="MediaServiceGenerationTime" ma:hidden="true" ma:internalName="MediaServiceGenerationTime" ma:readOnly="true">
+      <xsd:simpleType>
+        <xsd:restriction base="dms:Text"/>
+      </xsd:simpleType>
+    </xsd:element>
+    <xsd:element name="MediaServiceEventHashCode" ma:index="12" nillable="true" ma:displayName="MediaServiceEventHashCode" ma:hidden="true" ma:internalName="MediaServiceEventHashCode" ma:readOnly="true">
+      <xsd:simpleType>
+        <xsd:restriction base="dms:Text"/>
+      </xsd:simpleType>
+    </xsd:element>
+    <xsd:element name="MediaServiceDateTaken" ma:index="13" nillable="true" ma:displayName="MediaServiceDateTaken" ma:hidden="true" ma:internalName="MediaServiceDateTaken" ma:readOnly="true">
+      <xsd:simpleType>
+        <xsd:restriction base="dms:Text"/>
+      </xsd:simpleType>
+    </xsd:element>
+    <xsd:element name="MediaServiceOCR" ma:index="14" nillable="true" ma:displayName="Extracted Text" ma:internalName="MediaServiceOCR" ma:readOnly="true">
+      <xsd:simpleType>
+        <xsd:restriction base="dms:Note">
+          <xsd:maxLength value="255"/>
+        </xsd:restriction>
+      </xsd:simpleType>
+    </xsd:element>
+    <xsd:element name="MediaServiceAutoKeyPoints" ma:index="15" nillable="true" ma:displayName="MediaServiceAutoKeyPoints" ma:hidden="true" ma:internalName="MediaServiceAutoKeyPoints" ma:readOnly="true">
+      <xsd:simpleType>
+        <xsd:restriction base="dms:Note"/>
+      </xsd:simpleType>
+    </xsd:element>
+    <xsd:element name="MediaServiceKeyPoints" ma:index="16" nillable="true" ma:displayName="KeyPoints" ma:internalName="MediaServiceKeyPoints" ma:readOnly="true">
+      <xsd:simpleType>
+        <xsd:restriction base="dms:Note">
+          <xsd:maxLength value="255"/>
+        </xsd:restriction>
+      </xsd:simpleType>
+    </xsd:element>
+    <xsd:element name="MediaServiceLocation" ma:index="17" nillable="true" ma:displayName="Location" ma:internalName="MediaServiceLocation" ma:readOnly="true">
+      <xsd:simpleType>
+        <xsd:restriction base="dms:Text"/>
+      </xsd:simpleType>
+    </xsd:element>
+    <xsd:element name="MediaLengthInSeconds" ma:index="18" nillable="true" ma:displayName="Length (seconds)" ma:internalName="MediaLengthInSeconds" ma:readOnly="true">
+      <xsd:simpleType>
+        <xsd:restriction base="dms:Unknown"/>
+      </xsd:simpleType>
+    </xsd:element>
+  </xsd:schema>
+  <xsd:schema xmlns="http://schemas.openxmlformats.org/package/2006/metadata/core-properties" xmlns:xsd="http://www.w3.org/2001/XMLSchema" xmlns:xsi="http://www.w3.org/2001/XMLSchema-instance" xmlns:dc="http://purl.org/dc/elements/1.1/" xmlns:dcterms="http://purl.org/dc/terms/" xmlns:odoc="http://schemas.microsoft.com/internal/obd" targetNamespace="http://schemas.openxmlformats.org/package/2006/metadata/core-properties" elementFormDefault="qualified" attributeFormDefault="unqualified" blockDefault="#all">
+    <xsd:import namespace="http://purl.org/dc/elements/1.1/" schemaLocation="http://dublincore.org/schemas/xmls/qdc/2003/04/02/dc.xsd"/>
+    <xsd:import namespace="http://purl.org/dc/terms/" schemaLocation="http://dublincore.org/schemas/xmls/qdc/2003/04/02/dcterms.xsd"/>
+    <xsd:element name="coreProperties" type="CT_coreProperties"/>
+    <xsd:complexType name="CT_coreProperties">
+      <xsd:all>
+        <xsd:element ref="dc:creator" minOccurs="0" maxOccurs="1"/>
+        <xsd:element ref="dcterms:created" minOccurs="0" maxOccurs="1"/>
+        <xsd:element ref="dc:identifier" minOccurs="0" maxOccurs="1"/>
+        <xsd:element name="contentType" minOccurs="0" maxOccurs="1" type="xsd:string" ma:index="0" ma:displayName="Innholdstype"/>
+        <xsd:element ref="dc:title" minOccurs="0" maxOccurs="1" ma:index="4" ma:displayName="Tittel"/>
+        <xsd:element ref="dc:subject" minOccurs="0" maxOccurs="1"/>
+        <xsd:element ref="dc:description" minOccurs="0" maxOccurs="1"/>
+        <xsd:element name="keywords" minOccurs="0" maxOccurs="1" type="xsd:string"/>
+        <xsd:element ref="dc:language" minOccurs="0" maxOccurs="1"/>
+        <xsd:element name="category" minOccurs="0" maxOccurs="1" type="xsd:string"/>
+        <xsd:element name="version" minOccurs="0" maxOccurs="1" type="xsd:string"/>
+        <xsd:element name="revision" minOccurs="0" maxOccurs="1" type="xsd:string">
+          <xsd:annotation>
+            <xsd:documentation>
+                        This value indicates the number of saves or revisions. The application is responsible for updating this value after each revision.
+                    </xsd:documentation>
+          </xsd:annotation>
+        </xsd:element>
+        <xsd:element name="lastModifiedBy" minOccurs="0" maxOccurs="1" type="xsd:string"/>
+        <xsd:element ref="dcterms:modified" minOccurs="0" maxOccurs="1"/>
+        <xsd:element name="contentStatus" minOccurs="0" maxOccurs="1" type="xsd:string"/>
+      </xsd:all>
+    </xsd:complexType>
+  </xsd:schema>
+  <xs:schema xmlns:pc="http://schemas.microsoft.com/office/infopath/2007/PartnerControls" xmlns:xs="http://www.w3.org/2001/XMLSchema" targetNamespace="http://schemas.microsoft.com/office/infopath/2007/PartnerControls" elementFormDefault="qualified" attributeFormDefault="unqualified">
+    <xs:element name="Person">
+      <xs:complexType>
+        <xs:sequence>
+          <xs:element ref="pc:DisplayName" minOccurs="0"/>
+          <xs:element ref="pc:AccountId" minOccurs="0"/>
+          <xs:element ref="pc:AccountType" minOccurs="0"/>
+        </xs:sequence>
+      </xs:complexType>
+    </xs:element>
+    <xs:element name="DisplayName" type="xs:string"/>
+    <xs:element name="AccountId" type="xs:string"/>
+    <xs:element name="AccountType" type="xs:string"/>
+    <xs:element name="BDCAssociatedEntity">
+      <xs:complexType>
+        <xs:sequence>
+          <xs:element ref="pc:BDCEntity" minOccurs="0" maxOccurs="unbounded"/>
+        </xs:sequence>
+        <xs:attribute ref="pc:EntityNamespace"/>
+        <xs:attribute ref="pc:EntityName"/>
+        <xs:attribute ref="pc:SystemInstanceName"/>
+        <xs:attribute ref="pc:AssociationName"/>
+      </xs:complexType>
+    </xs:element>
+    <xs:attribute name="EntityNamespace" type="xs:string"/>
+    <xs:attribute name="EntityName" type="xs:string"/>
+    <xs:attribute name="SystemInstanceName" type="xs:string"/>
+    <xs:attribute name="AssociationName" type="xs:string"/>
+    <xs:element name="BDCEntity">
+      <xs:complexType>
+        <xs:sequence>
+          <xs:element ref="pc:EntityDisplayName" minOccurs="0"/>
+          <xs:element ref="pc:EntityInstanceReference" minOccurs="0"/>
+          <xs:element ref="pc:EntityId1" minOccurs="0"/>
+          <xs:element ref="pc:EntityId2" minOccurs="0"/>
+          <xs:element ref="pc:EntityId3" minOccurs="0"/>
+          <xs:element ref="pc:EntityId4" minOccurs="0"/>
+          <xs:element ref="pc:EntityId5" minOccurs="0"/>
+        </xs:sequence>
+      </xs:complexType>
+    </xs:element>
+    <xs:element name="EntityDisplayName" type="xs:string"/>
+    <xs:element name="EntityInstanceReference" type="xs:string"/>
+    <xs:element name="EntityId1" type="xs:string"/>
+    <xs:element name="EntityId2" type="xs:string"/>
+    <xs:element name="EntityId3" type="xs:string"/>
+    <xs:element name="EntityId4" type="xs:string"/>
+    <xs:element name="EntityId5" type="xs:string"/>
+    <xs:element name="Terms">
+      <xs:complexType>
+        <xs:sequence>
+          <xs:element ref="pc:TermInfo" minOccurs="0" maxOccurs="unbounded"/>
+        </xs:sequence>
+      </xs:complexType>
+    </xs:element>
+    <xs:element name="TermInfo">
+      <xs:complexType>
+        <xs:sequence>
+          <xs:element ref="pc:TermName" minOccurs="0"/>
+          <xs:element ref="pc:TermId" minOccurs="0"/>
+        </xs:sequence>
+      </xs:complexType>
+    </xs:element>
+    <xs:element name="TermName" type="xs:string"/>
+    <xs:element name="TermId" type="xs:string"/>
+  </xs:schema>
+</ct:contentTypeSchema>
+</file>
+
+<file path=customXml/item2.xml><?xml version="1.0" encoding="utf-8"?>
+<p:properties xmlns:p="http://schemas.microsoft.com/office/2006/metadata/properties" xmlns:xsi="http://www.w3.org/2001/XMLSchema-instance" xmlns:pc="http://schemas.microsoft.com/office/infopath/2007/PartnerControls">
+  <documentManagement/>
+</p:properties>
+</file>
+
+<file path=customXml/item3.xml><?xml version="1.0" encoding="utf-8"?>
+<?mso-contentType ?>
+<FormTemplates xmlns="http://schemas.microsoft.com/sharepoint/v3/contenttype/forms">
+  <Display>DocumentLibraryForm</Display>
+  <Edit>DocumentLibraryForm</Edit>
+  <New>DocumentLibraryForm</New>
+</FormTemplates>
+</file>
+
+<file path=customXml/itemProps1.xml><?xml version="1.0" encoding="utf-8"?>
+<ds:datastoreItem xmlns:ds="http://schemas.openxmlformats.org/officeDocument/2006/customXml" ds:itemID="{A749D303-0A35-41BA-B6CA-FCAD62C0A737}">
+  <ds:schemaRefs>
+    <ds:schemaRef ds:uri="http://schemas.microsoft.com/office/2006/metadata/contentType"/>
+    <ds:schemaRef ds:uri="http://schemas.microsoft.com/office/2006/metadata/properties/metaAttributes"/>
+    <ds:schemaRef ds:uri="http://www.w3.org/2001/XMLSchema"/>
+    <ds:schemaRef ds:uri="http://schemas.microsoft.com/office/2006/metadata/properties"/>
+    <ds:schemaRef ds:uri="3b00a67f-9791-437e-b702-303a706ea042"/>
+    <ds:schemaRef ds:uri="http://schemas.microsoft.com/office/2006/documentManagement/types"/>
+    <ds:schemaRef ds:uri="http://schemas.microsoft.com/office/infopath/2007/PartnerControls"/>
+    <ds:schemaRef ds:uri="http://schemas.openxmlformats.org/package/2006/metadata/core-properties"/>
+    <ds:schemaRef ds:uri="http://purl.org/dc/elements/1.1/"/>
+    <ds:schemaRef ds:uri="http://purl.org/dc/terms/"/>
+    <ds:schemaRef ds:uri="http://schemas.microsoft.com/internal/obd"/>
+  </ds:schemaRefs>
+</ds:datastoreItem>
+</file>
+
+<file path=customXml/itemProps2.xml><?xml version="1.0" encoding="utf-8"?>
+<ds:datastoreItem xmlns:ds="http://schemas.openxmlformats.org/officeDocument/2006/customXml" ds:itemID="{A36D4585-6B57-48C0-8B2E-F548AA74BAB9}">
+  <ds:schemaRefs>
+    <ds:schemaRef ds:uri="http://schemas.microsoft.com/office/2006/metadata/properties"/>
+    <ds:schemaRef ds:uri="http://schemas.microsoft.com/office/infopath/2007/PartnerControls"/>
+  </ds:schemaRefs>
+</ds:datastoreItem>
+</file>
+
+<file path=customXml/itemProps3.xml><?xml version="1.0" encoding="utf-8"?>
+<ds:datastoreItem xmlns:ds="http://schemas.openxmlformats.org/officeDocument/2006/customXml" ds:itemID="{3736BF7C-6A67-465F-A8DA-5D5EBBFF6E31}">
+  <ds:schemaRefs>
+    <ds:schemaRef ds:uri="http://schemas.microsoft.com/sharepoint/v3/contenttype/forms"/>
+  </ds:schemaRefs>
+</ds:datastoreItem>
 </file>
</xml_diff>